<commit_message>
added second topic for 2021 lecture
</commit_message>
<xml_diff>
--- a/AplikativniNivoIDomenDrivenDizajn.pptx
+++ b/AplikativniNivoIDomenDrivenDizajn.pptx
@@ -20,17 +20,12 @@
     <p:sldId id="262" r:id="rId14"/>
     <p:sldId id="263" r:id="rId15"/>
     <p:sldId id="264" r:id="rId16"/>
-    <p:sldId id="275" r:id="rId17"/>
-    <p:sldId id="276" r:id="rId18"/>
-    <p:sldId id="274" r:id="rId19"/>
-    <p:sldId id="277" r:id="rId20"/>
-    <p:sldId id="278" r:id="rId21"/>
-    <p:sldId id="279" r:id="rId22"/>
-    <p:sldId id="267" r:id="rId23"/>
-    <p:sldId id="281" r:id="rId24"/>
-    <p:sldId id="282" r:id="rId25"/>
-    <p:sldId id="268" r:id="rId26"/>
-    <p:sldId id="280" r:id="rId27"/>
+    <p:sldId id="283" r:id="rId17"/>
+    <p:sldId id="267" r:id="rId18"/>
+    <p:sldId id="281" r:id="rId19"/>
+    <p:sldId id="282" r:id="rId20"/>
+    <p:sldId id="268" r:id="rId21"/>
+    <p:sldId id="280" r:id="rId22"/>
   </p:sldIdLst>
   <p:sldSz cx="12192000" cy="6858000"/>
   <p:notesSz cx="6858000" cy="9144000"/>
@@ -329,7 +324,7 @@
             <a:fld id="{B61BEF0D-F0BB-DE4B-95CE-6DB70DBA9567}" type="datetimeFigureOut">
               <a:rPr lang="en-US" dirty="0"/>
               <a:pPr/>
-              <a:t>3/29/2020</a:t>
+              <a:t>12/17/2020</a:t>
             </a:fld>
             <a:endParaRPr lang="en-US" dirty="0"/>
           </a:p>
@@ -762,7 +757,7 @@
             <a:fld id="{B61BEF0D-F0BB-DE4B-95CE-6DB70DBA9567}" type="datetimeFigureOut">
               <a:rPr lang="en-US" dirty="0"/>
               <a:pPr/>
-              <a:t>3/29/2020</a:t>
+              <a:t>12/17/2020</a:t>
             </a:fld>
             <a:endParaRPr lang="en-US" dirty="0"/>
           </a:p>
@@ -1009,7 +1004,7 @@
             <a:fld id="{B61BEF0D-F0BB-DE4B-95CE-6DB70DBA9567}" type="datetimeFigureOut">
               <a:rPr lang="en-US" dirty="0"/>
               <a:pPr/>
-              <a:t>3/29/2020</a:t>
+              <a:t>12/17/2020</a:t>
             </a:fld>
             <a:endParaRPr lang="en-US" dirty="0"/>
           </a:p>
@@ -1314,7 +1309,7 @@
             <a:fld id="{B61BEF0D-F0BB-DE4B-95CE-6DB70DBA9567}" type="datetimeFigureOut">
               <a:rPr lang="en-US" dirty="0"/>
               <a:pPr/>
-              <a:t>3/29/2020</a:t>
+              <a:t>12/17/2020</a:t>
             </a:fld>
             <a:endParaRPr lang="en-US" dirty="0"/>
           </a:p>
@@ -1629,7 +1624,7 @@
             <a:fld id="{B61BEF0D-F0BB-DE4B-95CE-6DB70DBA9567}" type="datetimeFigureOut">
               <a:rPr lang="en-US" dirty="0"/>
               <a:pPr/>
-              <a:t>3/29/2020</a:t>
+              <a:t>12/17/2020</a:t>
             </a:fld>
             <a:endParaRPr lang="en-US" dirty="0"/>
           </a:p>
@@ -1928,7 +1923,7 @@
             <a:fld id="{B61BEF0D-F0BB-DE4B-95CE-6DB70DBA9567}" type="datetimeFigureOut">
               <a:rPr lang="en-US" dirty="0"/>
               <a:pPr/>
-              <a:t>3/29/2020</a:t>
+              <a:t>12/17/2020</a:t>
             </a:fld>
             <a:endParaRPr lang="en-US" dirty="0"/>
           </a:p>
@@ -2292,7 +2287,7 @@
             <a:fld id="{B61BEF0D-F0BB-DE4B-95CE-6DB70DBA9567}" type="datetimeFigureOut">
               <a:rPr lang="en-US" dirty="0"/>
               <a:pPr/>
-              <a:t>3/29/2020</a:t>
+              <a:t>12/17/2020</a:t>
             </a:fld>
             <a:endParaRPr lang="en-US" dirty="0"/>
           </a:p>
@@ -2463,7 +2458,7 @@
             <a:fld id="{B61BEF0D-F0BB-DE4B-95CE-6DB70DBA9567}" type="datetimeFigureOut">
               <a:rPr lang="en-US" dirty="0"/>
               <a:pPr/>
-              <a:t>3/29/2020</a:t>
+              <a:t>12/17/2020</a:t>
             </a:fld>
             <a:endParaRPr lang="en-US" dirty="0"/>
           </a:p>
@@ -2640,7 +2635,7 @@
             <a:fld id="{B61BEF0D-F0BB-DE4B-95CE-6DB70DBA9567}" type="datetimeFigureOut">
               <a:rPr lang="en-US" dirty="0"/>
               <a:pPr/>
-              <a:t>3/29/2020</a:t>
+              <a:t>12/17/2020</a:t>
             </a:fld>
             <a:endParaRPr lang="en-US" dirty="0"/>
           </a:p>
@@ -2807,7 +2802,7 @@
             <a:fld id="{B61BEF0D-F0BB-DE4B-95CE-6DB70DBA9567}" type="datetimeFigureOut">
               <a:rPr lang="en-US" dirty="0"/>
               <a:pPr/>
-              <a:t>3/29/2020</a:t>
+              <a:t>12/17/2020</a:t>
             </a:fld>
             <a:endParaRPr lang="en-US" dirty="0"/>
           </a:p>
@@ -3054,7 +3049,7 @@
             <a:fld id="{B61BEF0D-F0BB-DE4B-95CE-6DB70DBA9567}" type="datetimeFigureOut">
               <a:rPr lang="en-US" dirty="0"/>
               <a:pPr/>
-              <a:t>3/29/2020</a:t>
+              <a:t>12/17/2020</a:t>
             </a:fld>
             <a:endParaRPr lang="en-US" dirty="0"/>
           </a:p>
@@ -3287,7 +3282,7 @@
             <a:fld id="{B61BEF0D-F0BB-DE4B-95CE-6DB70DBA9567}" type="datetimeFigureOut">
               <a:rPr lang="en-US" dirty="0"/>
               <a:pPr/>
-              <a:t>3/29/2020</a:t>
+              <a:t>12/17/2020</a:t>
             </a:fld>
             <a:endParaRPr lang="en-US" dirty="0"/>
           </a:p>
@@ -3666,7 +3661,7 @@
             <a:fld id="{B61BEF0D-F0BB-DE4B-95CE-6DB70DBA9567}" type="datetimeFigureOut">
               <a:rPr lang="en-US" dirty="0"/>
               <a:pPr/>
-              <a:t>3/29/2020</a:t>
+              <a:t>12/17/2020</a:t>
             </a:fld>
             <a:endParaRPr lang="en-US" dirty="0"/>
           </a:p>
@@ -3781,7 +3776,7 @@
             <a:fld id="{B61BEF0D-F0BB-DE4B-95CE-6DB70DBA9567}" type="datetimeFigureOut">
               <a:rPr lang="en-US" dirty="0"/>
               <a:pPr/>
-              <a:t>3/29/2020</a:t>
+              <a:t>12/17/2020</a:t>
             </a:fld>
             <a:endParaRPr lang="en-US" dirty="0"/>
           </a:p>
@@ -3873,7 +3868,7 @@
             <a:fld id="{B61BEF0D-F0BB-DE4B-95CE-6DB70DBA9567}" type="datetimeFigureOut">
               <a:rPr lang="en-US" dirty="0"/>
               <a:pPr/>
-              <a:t>3/29/2020</a:t>
+              <a:t>12/17/2020</a:t>
             </a:fld>
             <a:endParaRPr lang="en-US" dirty="0"/>
           </a:p>
@@ -4125,7 +4120,7 @@
             <a:fld id="{B61BEF0D-F0BB-DE4B-95CE-6DB70DBA9567}" type="datetimeFigureOut">
               <a:rPr lang="en-US" dirty="0"/>
               <a:pPr/>
-              <a:t>3/29/2020</a:t>
+              <a:t>12/17/2020</a:t>
             </a:fld>
             <a:endParaRPr lang="en-US" dirty="0"/>
           </a:p>
@@ -4405,7 +4400,7 @@
             <a:fld id="{B61BEF0D-F0BB-DE4B-95CE-6DB70DBA9567}" type="datetimeFigureOut">
               <a:rPr lang="en-US" dirty="0"/>
               <a:pPr/>
-              <a:t>3/29/2020</a:t>
+              <a:t>12/17/2020</a:t>
             </a:fld>
             <a:endParaRPr lang="en-US" dirty="0"/>
           </a:p>
@@ -4808,7 +4803,7 @@
             <a:fld id="{B61BEF0D-F0BB-DE4B-95CE-6DB70DBA9567}" type="datetimeFigureOut">
               <a:rPr lang="en-US" dirty="0"/>
               <a:pPr/>
-              <a:t>3/29/2020</a:t>
+              <a:t>12/17/2020</a:t>
             </a:fld>
             <a:endParaRPr lang="en-US" dirty="0"/>
           </a:p>
@@ -6182,43 +6177,14 @@
       </p:grpSpPr>
       <p:sp>
         <p:nvSpPr>
-          <p:cNvPr id="2" name="Title 1"/>
-          <p:cNvSpPr>
-            <a:spLocks noGrp="1"/>
-          </p:cNvSpPr>
-          <p:nvPr>
-            <p:ph type="title"/>
-          </p:nvPr>
-        </p:nvSpPr>
-        <p:spPr>
-          <a:xfrm>
-            <a:off x="783067" y="805018"/>
-            <a:ext cx="8534400" cy="1507067"/>
-          </a:xfrm>
-        </p:spPr>
-        <p:txBody>
-          <a:bodyPr>
-            <a:normAutofit fontScale="90000"/>
-          </a:bodyPr>
-          <a:lstStyle/>
-          <a:p>
-            <a:r>
-              <a:rPr lang="sr-Latn-RS" dirty="0"/>
-              <a:t>CQRS(Command Query Responsibility Segregation) PATTERN</a:t>
-            </a:r>
-          </a:p>
-        </p:txBody>
-      </p:sp>
-      <p:sp>
-        <p:nvSpPr>
           <p:cNvPr id="5" name="TextBox 4"/>
           <p:cNvSpPr txBox="1"/>
           <p:nvPr/>
         </p:nvSpPr>
         <p:spPr>
           <a:xfrm>
-            <a:off x="783067" y="2312085"/>
-            <a:ext cx="8534400" cy="2308324"/>
+            <a:off x="774829" y="886939"/>
+            <a:ext cx="8534400" cy="4216539"/>
           </a:xfrm>
           <a:prstGeom prst="rect">
             <a:avLst/>
@@ -6236,29 +6202,229 @@
               <a:buChar char="•"/>
             </a:pPr>
             <a:r>
-              <a:rPr lang="en-US" sz="3600" dirty="0"/>
-              <a:t>The principle states that a well designed object should have methods that are either </a:t>
-            </a:r>
-            <a:r>
-              <a:rPr lang="en-US" sz="3600" i="1" dirty="0"/>
-              <a:t>commands</a:t>
-            </a:r>
-            <a:r>
-              <a:rPr lang="en-US" sz="3600" dirty="0"/>
-              <a:t> or </a:t>
-            </a:r>
-            <a:r>
-              <a:rPr lang="en-US" sz="3600" i="1" dirty="0" smtClean="0"/>
-              <a:t>queries</a:t>
-            </a:r>
-            <a:endParaRPr lang="sr-Latn-RS" sz="3600" dirty="0"/>
+              <a:rPr lang="en-US" sz="2800" dirty="0" smtClean="0">
+                <a:ln w="0"/>
+                <a:effectLst>
+                  <a:outerShdw blurRad="38100" dist="25400" dir="5400000" algn="ctr" rotWithShape="0">
+                    <a:srgbClr val="6E747A">
+                      <a:alpha val="43000"/>
+                    </a:srgbClr>
+                  </a:outerShdw>
+                </a:effectLst>
+              </a:rPr>
+              <a:t>From book </a:t>
+            </a:r>
+            <a:r>
+              <a:rPr lang="en-US" sz="2800" dirty="0">
+                <a:ln w="0"/>
+                <a:effectLst>
+                  <a:outerShdw blurRad="38100" dist="25400" dir="5400000" algn="ctr" rotWithShape="0">
+                    <a:srgbClr val="6E747A">
+                      <a:alpha val="43000"/>
+                    </a:srgbClr>
+                  </a:outerShdw>
+                </a:effectLst>
+              </a:rPr>
+              <a:t>Clean </a:t>
+            </a:r>
+            <a:r>
+              <a:rPr lang="en-US" sz="2800" dirty="0" smtClean="0">
+                <a:ln w="0"/>
+                <a:effectLst>
+                  <a:outerShdw blurRad="38100" dist="25400" dir="5400000" algn="ctr" rotWithShape="0">
+                    <a:srgbClr val="6E747A">
+                      <a:alpha val="43000"/>
+                    </a:srgbClr>
+                  </a:outerShdw>
+                </a:effectLst>
+              </a:rPr>
+              <a:t>Architecture – Uncle Bob</a:t>
+            </a:r>
+            <a:endParaRPr lang="sr-Latn-RS" sz="2800" dirty="0">
+              <a:ln w="0"/>
+              <a:effectLst>
+                <a:outerShdw blurRad="38100" dist="25400" dir="5400000" algn="ctr" rotWithShape="0">
+                  <a:srgbClr val="6E747A">
+                    <a:alpha val="43000"/>
+                  </a:srgbClr>
+                </a:outerShdw>
+              </a:effectLst>
+            </a:endParaRPr>
+          </a:p>
+          <a:p>
+            <a:pPr marL="285750" indent="-285750">
+              <a:buFont typeface="Arial" panose="020B0604020202020204" pitchFamily="34" charset="0"/>
+              <a:buChar char="•"/>
+            </a:pPr>
+            <a:r>
+              <a:rPr lang="en-US" sz="4400" dirty="0" smtClean="0">
+                <a:ln w="0"/>
+                <a:effectLst>
+                  <a:outerShdw blurRad="38100" dist="25400" dir="5400000" algn="ctr" rotWithShape="0">
+                    <a:srgbClr val="6E747A">
+                      <a:alpha val="43000"/>
+                    </a:srgbClr>
+                  </a:outerShdw>
+                </a:effectLst>
+              </a:rPr>
+              <a:t>The database is a </a:t>
+            </a:r>
+            <a:r>
+              <a:rPr lang="en-US" sz="4400" dirty="0" smtClean="0">
+                <a:ln w="0"/>
+                <a:effectLst>
+                  <a:outerShdw blurRad="38100" dist="25400" dir="5400000" algn="ctr" rotWithShape="0">
+                    <a:srgbClr val="6E747A">
+                      <a:alpha val="43000"/>
+                    </a:srgbClr>
+                  </a:outerShdw>
+                </a:effectLst>
+              </a:rPr>
+              <a:t>detail </a:t>
+            </a:r>
+            <a:r>
+              <a:rPr lang="en-US" sz="2800" dirty="0" smtClean="0">
+                <a:ln w="0"/>
+                <a:effectLst>
+                  <a:outerShdw blurRad="38100" dist="25400" dir="5400000" algn="ctr" rotWithShape="0">
+                    <a:srgbClr val="6E747A">
+                      <a:alpha val="43000"/>
+                    </a:srgbClr>
+                  </a:outerShdw>
+                </a:effectLst>
+              </a:rPr>
+              <a:t>(chapter 30)</a:t>
+            </a:r>
+            <a:endParaRPr lang="en-US" sz="2800" dirty="0" smtClean="0">
+              <a:ln w="0"/>
+              <a:effectLst>
+                <a:outerShdw blurRad="38100" dist="25400" dir="5400000" algn="ctr" rotWithShape="0">
+                  <a:srgbClr val="6E747A">
+                    <a:alpha val="43000"/>
+                  </a:srgbClr>
+                </a:outerShdw>
+              </a:effectLst>
+            </a:endParaRPr>
+          </a:p>
+          <a:p>
+            <a:pPr marL="285750" indent="-285750">
+              <a:buFont typeface="Arial" panose="020B0604020202020204" pitchFamily="34" charset="0"/>
+              <a:buChar char="•"/>
+            </a:pPr>
+            <a:r>
+              <a:rPr lang="en-US" sz="4400" dirty="0" smtClean="0">
+                <a:ln w="0"/>
+                <a:effectLst>
+                  <a:outerShdw blurRad="38100" dist="25400" dir="5400000" algn="ctr" rotWithShape="0">
+                    <a:srgbClr val="6E747A">
+                      <a:alpha val="43000"/>
+                    </a:srgbClr>
+                  </a:outerShdw>
+                </a:effectLst>
+              </a:rPr>
+              <a:t>The Web is a </a:t>
+            </a:r>
+            <a:r>
+              <a:rPr lang="en-US" sz="4400" dirty="0" smtClean="0">
+                <a:ln w="0"/>
+                <a:effectLst>
+                  <a:outerShdw blurRad="38100" dist="25400" dir="5400000" algn="ctr" rotWithShape="0">
+                    <a:srgbClr val="6E747A">
+                      <a:alpha val="43000"/>
+                    </a:srgbClr>
+                  </a:outerShdw>
+                </a:effectLst>
+              </a:rPr>
+              <a:t>detail</a:t>
+            </a:r>
+            <a:r>
+              <a:rPr lang="en-US" sz="2800" dirty="0" smtClean="0">
+                <a:ln w="0"/>
+                <a:effectLst>
+                  <a:outerShdw blurRad="38100" dist="25400" dir="5400000" algn="ctr" rotWithShape="0">
+                    <a:srgbClr val="6E747A">
+                      <a:alpha val="43000"/>
+                    </a:srgbClr>
+                  </a:outerShdw>
+                </a:effectLst>
+              </a:rPr>
+              <a:t>               (chapter 31)</a:t>
+            </a:r>
+            <a:endParaRPr lang="en-US" sz="4400" dirty="0" smtClean="0">
+              <a:ln w="0"/>
+              <a:effectLst>
+                <a:outerShdw blurRad="38100" dist="25400" dir="5400000" algn="ctr" rotWithShape="0">
+                  <a:srgbClr val="6E747A">
+                    <a:alpha val="43000"/>
+                  </a:srgbClr>
+                </a:outerShdw>
+              </a:effectLst>
+            </a:endParaRPr>
+          </a:p>
+          <a:p>
+            <a:pPr marL="285750" indent="-285750">
+              <a:buFont typeface="Arial" panose="020B0604020202020204" pitchFamily="34" charset="0"/>
+              <a:buChar char="•"/>
+            </a:pPr>
+            <a:r>
+              <a:rPr lang="en-US" sz="4400" dirty="0" smtClean="0">
+                <a:ln w="0"/>
+                <a:effectLst>
+                  <a:outerShdw blurRad="38100" dist="25400" dir="5400000" algn="ctr" rotWithShape="0">
+                    <a:srgbClr val="6E747A">
+                      <a:alpha val="43000"/>
+                    </a:srgbClr>
+                  </a:outerShdw>
+                </a:effectLst>
+              </a:rPr>
+              <a:t>The Frameworks are </a:t>
+            </a:r>
+            <a:r>
+              <a:rPr lang="en-US" sz="4400" dirty="0" smtClean="0">
+                <a:ln w="0"/>
+                <a:effectLst>
+                  <a:outerShdw blurRad="38100" dist="25400" dir="5400000" algn="ctr" rotWithShape="0">
+                    <a:srgbClr val="6E747A">
+                      <a:alpha val="43000"/>
+                    </a:srgbClr>
+                  </a:outerShdw>
+                </a:effectLst>
+              </a:rPr>
+              <a:t>details </a:t>
+            </a:r>
+            <a:r>
+              <a:rPr lang="en-US" sz="2800" dirty="0" smtClean="0">
+                <a:ln w="0"/>
+                <a:effectLst>
+                  <a:outerShdw blurRad="38100" dist="25400" dir="5400000" algn="ctr" rotWithShape="0">
+                    <a:srgbClr val="6E747A">
+                      <a:alpha val="43000"/>
+                    </a:srgbClr>
+                  </a:outerShdw>
+                </a:effectLst>
+              </a:rPr>
+              <a:t>(chapter 32)</a:t>
+            </a:r>
+            <a:endParaRPr lang="sr-Latn-RS" sz="4400" dirty="0" smtClean="0">
+              <a:ln w="0"/>
+              <a:effectLst>
+                <a:outerShdw blurRad="38100" dist="25400" dir="5400000" algn="ctr" rotWithShape="0">
+                  <a:srgbClr val="6E747A">
+                    <a:alpha val="43000"/>
+                  </a:srgbClr>
+                </a:outerShdw>
+              </a:effectLst>
+            </a:endParaRPr>
+          </a:p>
+          <a:p>
+            <a:endParaRPr lang="sr-Latn-RS" sz="2400" dirty="0" smtClean="0"/>
           </a:p>
         </p:txBody>
       </p:sp>
     </p:spTree>
     <p:extLst>
       <p:ext uri="{BB962C8B-B14F-4D97-AF65-F5344CB8AC3E}">
-        <p14:creationId xmlns:p14="http://schemas.microsoft.com/office/powerpoint/2010/main" val="1843468937"/>
+        <p14:creationId xmlns:p14="http://schemas.microsoft.com/office/powerpoint/2010/main" val="1678753052"/>
       </p:ext>
     </p:extLst>
   </p:cSld>
@@ -6309,15 +6475,42 @@
           </a:xfrm>
         </p:spPr>
         <p:txBody>
-          <a:bodyPr>
-            <a:normAutofit fontScale="90000"/>
-          </a:bodyPr>
-          <a:lstStyle/>
-          <a:p>
-            <a:r>
-              <a:rPr lang="sr-Latn-RS" dirty="0"/>
-              <a:t>CQRS(Command Query Responsibility Segregation) PATTERN</a:t>
-            </a:r>
+          <a:bodyPr/>
+          <a:lstStyle/>
+          <a:p>
+            <a:r>
+              <a:rPr lang="en-US" dirty="0" err="1" smtClean="0"/>
+              <a:t>Entit</a:t>
+            </a:r>
+            <a:r>
+              <a:rPr lang="sr-Latn-RS" dirty="0" smtClean="0"/>
+              <a:t>ies</a:t>
+            </a:r>
+            <a:r>
+              <a:rPr lang="en-US" dirty="0" smtClean="0"/>
+              <a:t> </a:t>
+            </a:r>
+            <a:r>
+              <a:rPr lang="sr-Latn-RS" dirty="0" smtClean="0"/>
+              <a:t>and</a:t>
+            </a:r>
+            <a:r>
+              <a:rPr lang="en-US" dirty="0" smtClean="0"/>
+              <a:t> </a:t>
+            </a:r>
+            <a:r>
+              <a:rPr lang="en-US" dirty="0"/>
+              <a:t>Value </a:t>
+            </a:r>
+            <a:r>
+              <a:rPr lang="en-US" dirty="0" smtClean="0"/>
+              <a:t>Object</a:t>
+            </a:r>
+            <a:r>
+              <a:rPr lang="sr-Latn-RS" dirty="0" smtClean="0"/>
+              <a:t>s</a:t>
+            </a:r>
+            <a:endParaRPr lang="sr-Latn-RS" dirty="0"/>
           </a:p>
         </p:txBody>
       </p:sp>
@@ -6330,7 +6523,7 @@
         <p:spPr>
           <a:xfrm>
             <a:off x="783067" y="2312085"/>
-            <a:ext cx="8534400" cy="2862322"/>
+            <a:ext cx="10898860" cy="4708981"/>
           </a:xfrm>
           <a:prstGeom prst="rect">
             <a:avLst/>
@@ -6348,52 +6541,232 @@
               <a:buChar char="•"/>
             </a:pPr>
             <a:r>
-              <a:rPr lang="en-US" sz="3600" dirty="0"/>
-              <a:t>A </a:t>
-            </a:r>
-            <a:r>
-              <a:rPr lang="en-US" sz="3600" i="1" dirty="0"/>
-              <a:t>command</a:t>
-            </a:r>
-            <a:r>
-              <a:rPr lang="en-US" sz="3600" dirty="0"/>
-              <a:t> changes the state of an object, but does not return any </a:t>
-            </a:r>
-            <a:r>
-              <a:rPr lang="en-US" sz="3600" dirty="0" smtClean="0"/>
-              <a:t>data</a:t>
-            </a:r>
-            <a:endParaRPr lang="sr-Latn-RS" sz="3600" dirty="0" smtClean="0"/>
+              <a:rPr lang="en-US" sz="2400" dirty="0" err="1" smtClean="0"/>
+              <a:t>Entit</a:t>
+            </a:r>
+            <a:r>
+              <a:rPr lang="sr-Latn-RS" sz="2400" dirty="0" smtClean="0"/>
+              <a:t>ies</a:t>
+            </a:r>
+            <a:r>
+              <a:rPr lang="en-US" sz="2400" dirty="0" smtClean="0"/>
+              <a:t> </a:t>
+            </a:r>
+            <a:r>
+              <a:rPr lang="sr-Latn-RS" sz="2400" dirty="0" smtClean="0"/>
+              <a:t>have</a:t>
+            </a:r>
+            <a:r>
+              <a:rPr lang="en-US" sz="2400" dirty="0" smtClean="0"/>
+              <a:t> </a:t>
+            </a:r>
+            <a:r>
+              <a:rPr lang="en-US" sz="2400" dirty="0"/>
+              <a:t>id </a:t>
+            </a:r>
+            <a:r>
+              <a:rPr lang="sr-Latn-RS" sz="2400" dirty="0" smtClean="0"/>
+              <a:t>and they are</a:t>
+            </a:r>
+            <a:r>
+              <a:rPr lang="en-US" sz="2400" dirty="0" smtClean="0"/>
+              <a:t> </a:t>
+            </a:r>
+            <a:r>
+              <a:rPr lang="sr-Latn-RS" sz="2400" dirty="0" smtClean="0"/>
+              <a:t>mutable</a:t>
+            </a:r>
           </a:p>
           <a:p>
             <a:pPr marL="285750" indent="-285750">
               <a:buFont typeface="Arial" panose="020B0604020202020204" pitchFamily="34" charset="0"/>
               <a:buChar char="•"/>
             </a:pPr>
-            <a:r>
-              <a:rPr lang="sr-Latn-RS" sz="3600" dirty="0"/>
-              <a:t>A</a:t>
-            </a:r>
-            <a:r>
-              <a:rPr lang="en-US" sz="3600" dirty="0" smtClean="0"/>
+            <a:endParaRPr lang="sr-Latn-RS" sz="3600" dirty="0" smtClean="0"/>
+          </a:p>
+          <a:p>
+            <a:pPr marL="285750" indent="-285750">
+              <a:buFont typeface="Arial" panose="020B0604020202020204" pitchFamily="34" charset="0"/>
+              <a:buChar char="•"/>
+            </a:pPr>
+            <a:r>
+              <a:rPr lang="en-US" sz="2400" dirty="0" smtClean="0"/>
+              <a:t>Value Object</a:t>
+            </a:r>
+            <a:r>
+              <a:rPr lang="sr-Latn-RS" sz="2400" dirty="0" smtClean="0"/>
+              <a:t>s</a:t>
+            </a:r>
+            <a:r>
+              <a:rPr lang="en-US" sz="2400" dirty="0" smtClean="0"/>
               <a:t> </a:t>
             </a:r>
             <a:r>
-              <a:rPr lang="en-US" sz="3600" i="1" dirty="0"/>
-              <a:t>query</a:t>
-            </a:r>
-            <a:r>
-              <a:rPr lang="en-US" sz="3600" dirty="0"/>
-              <a:t> returns data and does not change any state</a:t>
-            </a:r>
-            <a:endParaRPr lang="sr-Latn-RS" sz="3600" dirty="0"/>
+              <a:rPr lang="sr-Latn-RS" sz="2400" dirty="0" smtClean="0"/>
+              <a:t>have not</a:t>
+            </a:r>
+            <a:r>
+              <a:rPr lang="en-US" sz="2400" dirty="0" smtClean="0"/>
+              <a:t> </a:t>
+            </a:r>
+            <a:r>
+              <a:rPr lang="en-US" sz="2400" dirty="0"/>
+              <a:t>id </a:t>
+            </a:r>
+            <a:r>
+              <a:rPr lang="sr-Latn-RS" sz="2400" dirty="0" smtClean="0"/>
+              <a:t>and</a:t>
+            </a:r>
+            <a:r>
+              <a:rPr lang="en-US" sz="2400" dirty="0" smtClean="0"/>
+              <a:t> </a:t>
+            </a:r>
+            <a:r>
+              <a:rPr lang="sr-Latn-RS" sz="2400" dirty="0" smtClean="0"/>
+              <a:t>they are</a:t>
+            </a:r>
+            <a:r>
+              <a:rPr lang="en-US" sz="2400" dirty="0" smtClean="0"/>
+              <a:t> immutable</a:t>
+            </a:r>
+            <a:endParaRPr lang="sr-Latn-RS" sz="2400" dirty="0" smtClean="0"/>
+          </a:p>
+          <a:p>
+            <a:pPr marL="285750" indent="-285750">
+              <a:buFont typeface="Arial" panose="020B0604020202020204" pitchFamily="34" charset="0"/>
+              <a:buChar char="•"/>
+            </a:pPr>
+            <a:endParaRPr lang="sr-Latn-RS" sz="2400" dirty="0" smtClean="0"/>
+          </a:p>
+          <a:p>
+            <a:pPr marL="285750" indent="-285750">
+              <a:buFont typeface="Arial" panose="020B0604020202020204" pitchFamily="34" charset="0"/>
+              <a:buChar char="•"/>
+            </a:pPr>
+            <a:r>
+              <a:rPr lang="en-US" sz="2400" dirty="0" err="1"/>
+              <a:t>Entit</a:t>
+            </a:r>
+            <a:r>
+              <a:rPr lang="sr-Latn-RS" sz="2400" dirty="0"/>
+              <a:t>ies</a:t>
+            </a:r>
+            <a:r>
+              <a:rPr lang="en-US" sz="2400" dirty="0"/>
+              <a:t> </a:t>
+            </a:r>
+            <a:r>
+              <a:rPr lang="sr-Latn-RS" sz="2400" dirty="0" smtClean="0"/>
+              <a:t>have their tables in the database</a:t>
+            </a:r>
+          </a:p>
+          <a:p>
+            <a:pPr marL="285750" indent="-285750">
+              <a:buFont typeface="Arial" panose="020B0604020202020204" pitchFamily="34" charset="0"/>
+              <a:buChar char="•"/>
+            </a:pPr>
+            <a:endParaRPr lang="sr-Latn-RS" sz="2400" dirty="0" smtClean="0"/>
+          </a:p>
+          <a:p>
+            <a:pPr marL="285750" indent="-285750">
+              <a:buFont typeface="Arial" panose="020B0604020202020204" pitchFamily="34" charset="0"/>
+              <a:buChar char="•"/>
+            </a:pPr>
+            <a:r>
+              <a:rPr lang="en-US" sz="2400" dirty="0"/>
+              <a:t>Value </a:t>
+            </a:r>
+            <a:r>
+              <a:rPr lang="en-US" sz="2400" dirty="0" smtClean="0"/>
+              <a:t>Object</a:t>
+            </a:r>
+            <a:r>
+              <a:rPr lang="sr-Latn-RS" sz="2400" dirty="0" smtClean="0"/>
+              <a:t>s</a:t>
+            </a:r>
+            <a:r>
+              <a:rPr lang="en-US" sz="2400" dirty="0" smtClean="0"/>
+              <a:t> </a:t>
+            </a:r>
+            <a:r>
+              <a:rPr lang="sr-Latn-RS" sz="2400" dirty="0" smtClean="0"/>
+              <a:t>have not </a:t>
+            </a:r>
+            <a:r>
+              <a:rPr lang="sr-Latn-RS" sz="2400" dirty="0"/>
+              <a:t>their </a:t>
+            </a:r>
+            <a:r>
+              <a:rPr lang="sr-Latn-RS" sz="2400" dirty="0" smtClean="0"/>
+              <a:t>tables </a:t>
+            </a:r>
+            <a:r>
+              <a:rPr lang="sr-Latn-RS" sz="2400" dirty="0"/>
+              <a:t>in the database</a:t>
+            </a:r>
+            <a:endParaRPr lang="sr-Latn-RS" sz="2400" dirty="0" smtClean="0"/>
+          </a:p>
+          <a:p>
+            <a:pPr marL="285750" indent="-285750">
+              <a:buFont typeface="Arial" panose="020B0604020202020204" pitchFamily="34" charset="0"/>
+              <a:buChar char="•"/>
+            </a:pPr>
+            <a:endParaRPr lang="en-US" sz="2400" dirty="0"/>
+          </a:p>
+          <a:p>
+            <a:pPr marL="285750" indent="-285750">
+              <a:buFont typeface="Arial" panose="020B0604020202020204" pitchFamily="34" charset="0"/>
+              <a:buChar char="•"/>
+            </a:pPr>
+            <a:r>
+              <a:rPr lang="en-US" sz="2400" dirty="0"/>
+              <a:t>Value </a:t>
+            </a:r>
+            <a:r>
+              <a:rPr lang="en-US" sz="2400" dirty="0" smtClean="0"/>
+              <a:t>Object</a:t>
+            </a:r>
+            <a:r>
+              <a:rPr lang="sr-Latn-RS" sz="2400" dirty="0" smtClean="0"/>
+              <a:t>s</a:t>
+            </a:r>
+            <a:r>
+              <a:rPr lang="en-US" sz="2400" dirty="0" smtClean="0"/>
+              <a:t> </a:t>
+            </a:r>
+            <a:r>
+              <a:rPr lang="sr-Latn-RS" sz="2400" dirty="0" smtClean="0"/>
+              <a:t>cannot exist without and entity</a:t>
+            </a:r>
+            <a:endParaRPr lang="en-US" sz="2400" dirty="0"/>
+          </a:p>
+          <a:p>
+            <a:pPr marL="285750" indent="-285750">
+              <a:buFont typeface="Arial" panose="020B0604020202020204" pitchFamily="34" charset="0"/>
+              <a:buChar char="•"/>
+            </a:pPr>
+            <a:endParaRPr lang="en-US" sz="2400" dirty="0"/>
+          </a:p>
+          <a:p>
+            <a:pPr marL="285750" indent="-285750">
+              <a:buFont typeface="Arial" panose="020B0604020202020204" pitchFamily="34" charset="0"/>
+              <a:buChar char="•"/>
+            </a:pPr>
+            <a:endParaRPr lang="en-US" sz="2400" dirty="0"/>
+          </a:p>
+          <a:p>
+            <a:pPr marL="285750" indent="-285750">
+              <a:buFont typeface="Arial" panose="020B0604020202020204" pitchFamily="34" charset="0"/>
+              <a:buChar char="•"/>
+            </a:pPr>
+            <a:endParaRPr lang="sr-Latn-RS" sz="2400" dirty="0"/>
           </a:p>
         </p:txBody>
       </p:sp>
     </p:spTree>
     <p:extLst>
       <p:ext uri="{BB962C8B-B14F-4D97-AF65-F5344CB8AC3E}">
-        <p14:creationId xmlns:p14="http://schemas.microsoft.com/office/powerpoint/2010/main" val="3492246574"/>
+        <p14:creationId xmlns:p14="http://schemas.microsoft.com/office/powerpoint/2010/main" val="1019193396"/>
       </p:ext>
     </p:extLst>
   </p:cSld>
@@ -6427,39 +6800,55 @@
           <a:chExt cx="0" cy="0"/>
         </a:xfrm>
       </p:grpSpPr>
-      <p:pic>
-        <p:nvPicPr>
-          <p:cNvPr id="4" name="Content Placeholder 3"/>
-          <p:cNvPicPr>
-            <a:picLocks noGrp="1" noChangeAspect="1"/>
-          </p:cNvPicPr>
-          <p:nvPr>
-            <p:ph idx="1"/>
-          </p:nvPr>
-        </p:nvPicPr>
-        <p:blipFill>
-          <a:blip r:embed="rId2">
-            <a:extLst>
-              <a:ext uri="{28A0092B-C50C-407E-A947-70E740481C1C}">
-                <a14:useLocalDpi xmlns:a14="http://schemas.microsoft.com/office/drawing/2010/main" val="0"/>
-              </a:ext>
-            </a:extLst>
-          </a:blip>
-          <a:stretch>
-            <a:fillRect/>
-          </a:stretch>
-        </p:blipFill>
+      <p:sp>
+        <p:nvSpPr>
+          <p:cNvPr id="5" name="TextBox 4"/>
+          <p:cNvSpPr txBox="1"/>
+          <p:nvPr/>
+        </p:nvSpPr>
         <p:spPr>
           <a:xfrm>
-            <a:off x="1655805" y="567002"/>
-            <a:ext cx="8320215" cy="5590144"/>
+            <a:off x="799542" y="1488301"/>
+            <a:ext cx="10898860" cy="3416320"/>
           </a:xfrm>
+          <a:prstGeom prst="rect">
+            <a:avLst/>
+          </a:prstGeom>
+          <a:noFill/>
         </p:spPr>
-      </p:pic>
+        <p:txBody>
+          <a:bodyPr wrap="square" rtlCol="0">
+            <a:spAutoFit/>
+          </a:bodyPr>
+          <a:lstStyle/>
+          <a:p>
+            <a:pPr marL="285750" indent="-285750">
+              <a:buFont typeface="Arial" panose="020B0604020202020204" pitchFamily="34" charset="0"/>
+              <a:buChar char="•"/>
+            </a:pPr>
+            <a:r>
+              <a:rPr lang="sr-Latn-RS" sz="7200" b="1" dirty="0" smtClean="0"/>
+              <a:t>Be careful </a:t>
+            </a:r>
+            <a:r>
+              <a:rPr lang="sr-Latn-RS" sz="7200" dirty="0" smtClean="0"/>
+              <a:t>of too many value object types</a:t>
+            </a:r>
+            <a:endParaRPr lang="en-US" sz="7200" dirty="0"/>
+          </a:p>
+          <a:p>
+            <a:pPr marL="285750" indent="-285750">
+              <a:buFont typeface="Arial" panose="020B0604020202020204" pitchFamily="34" charset="0"/>
+              <a:buChar char="•"/>
+            </a:pPr>
+            <a:endParaRPr lang="sr-Latn-RS" sz="7200" dirty="0"/>
+          </a:p>
+        </p:txBody>
+      </p:sp>
     </p:spTree>
     <p:extLst>
       <p:ext uri="{BB962C8B-B14F-4D97-AF65-F5344CB8AC3E}">
-        <p14:creationId xmlns:p14="http://schemas.microsoft.com/office/powerpoint/2010/main" val="2964187254"/>
+        <p14:creationId xmlns:p14="http://schemas.microsoft.com/office/powerpoint/2010/main" val="1277892097"/>
       </p:ext>
     </p:extLst>
   </p:cSld>
@@ -6493,39 +6882,55 @@
           <a:chExt cx="0" cy="0"/>
         </a:xfrm>
       </p:grpSpPr>
-      <p:pic>
-        <p:nvPicPr>
-          <p:cNvPr id="6" name="Content Placeholder 5"/>
-          <p:cNvPicPr>
-            <a:picLocks noGrp="1" noChangeAspect="1"/>
-          </p:cNvPicPr>
-          <p:nvPr>
-            <p:ph idx="1"/>
-          </p:nvPr>
-        </p:nvPicPr>
-        <p:blipFill>
-          <a:blip r:embed="rId2">
-            <a:extLst>
-              <a:ext uri="{28A0092B-C50C-407E-A947-70E740481C1C}">
-                <a14:useLocalDpi xmlns:a14="http://schemas.microsoft.com/office/drawing/2010/main" val="0"/>
-              </a:ext>
-            </a:extLst>
-          </a:blip>
-          <a:stretch>
-            <a:fillRect/>
-          </a:stretch>
-        </p:blipFill>
+      <p:sp>
+        <p:nvSpPr>
+          <p:cNvPr id="5" name="TextBox 4"/>
+          <p:cNvSpPr txBox="1"/>
+          <p:nvPr/>
+        </p:nvSpPr>
         <p:spPr>
           <a:xfrm>
-            <a:off x="2714121" y="685800"/>
-            <a:ext cx="7007854" cy="5661212"/>
+            <a:off x="799542" y="1488301"/>
+            <a:ext cx="10898860" cy="4524315"/>
           </a:xfrm>
+          <a:prstGeom prst="rect">
+            <a:avLst/>
+          </a:prstGeom>
+          <a:noFill/>
         </p:spPr>
-      </p:pic>
+        <p:txBody>
+          <a:bodyPr wrap="square" rtlCol="0">
+            <a:spAutoFit/>
+          </a:bodyPr>
+          <a:lstStyle/>
+          <a:p>
+            <a:pPr marL="285750" indent="-285750">
+              <a:buFont typeface="Arial" panose="020B0604020202020204" pitchFamily="34" charset="0"/>
+              <a:buChar char="•"/>
+            </a:pPr>
+            <a:r>
+              <a:rPr lang="sr-Latn-RS" sz="7200" dirty="0" smtClean="0"/>
+              <a:t>Add value object types </a:t>
+            </a:r>
+            <a:r>
+              <a:rPr lang="sr-Latn-RS" sz="7200" b="1" dirty="0" smtClean="0"/>
+              <a:t>as you need them(not before)</a:t>
+            </a:r>
+            <a:endParaRPr lang="en-US" sz="7200" b="1" dirty="0"/>
+          </a:p>
+          <a:p>
+            <a:pPr marL="285750" indent="-285750">
+              <a:buFont typeface="Arial" panose="020B0604020202020204" pitchFamily="34" charset="0"/>
+              <a:buChar char="•"/>
+            </a:pPr>
+            <a:endParaRPr lang="sr-Latn-RS" sz="7200" dirty="0"/>
+          </a:p>
+        </p:txBody>
+      </p:sp>
     </p:spTree>
     <p:extLst>
       <p:ext uri="{BB962C8B-B14F-4D97-AF65-F5344CB8AC3E}">
-        <p14:creationId xmlns:p14="http://schemas.microsoft.com/office/powerpoint/2010/main" val="2577896439"/>
+        <p14:creationId xmlns:p14="http://schemas.microsoft.com/office/powerpoint/2010/main" val="1125663737"/>
       </p:ext>
     </p:extLst>
   </p:cSld>
@@ -6708,737 +7113,6 @@
           <a:chExt cx="0" cy="0"/>
         </a:xfrm>
       </p:grpSpPr>
-      <p:sp>
-        <p:nvSpPr>
-          <p:cNvPr id="2" name="Title 1"/>
-          <p:cNvSpPr>
-            <a:spLocks noGrp="1"/>
-          </p:cNvSpPr>
-          <p:nvPr>
-            <p:ph type="title"/>
-          </p:nvPr>
-        </p:nvSpPr>
-        <p:spPr>
-          <a:xfrm>
-            <a:off x="783067" y="805018"/>
-            <a:ext cx="8534400" cy="1507067"/>
-          </a:xfrm>
-        </p:spPr>
-        <p:txBody>
-          <a:bodyPr>
-            <a:normAutofit/>
-          </a:bodyPr>
-          <a:lstStyle/>
-          <a:p>
-            <a:r>
-              <a:rPr lang="sr-Latn-RS" dirty="0" smtClean="0"/>
-              <a:t>QUERY IN CQRS </a:t>
-            </a:r>
-            <a:r>
-              <a:rPr lang="sr-Latn-RS" dirty="0"/>
-              <a:t>PATTERN</a:t>
-            </a:r>
-          </a:p>
-        </p:txBody>
-      </p:sp>
-      <p:sp>
-        <p:nvSpPr>
-          <p:cNvPr id="5" name="TextBox 4"/>
-          <p:cNvSpPr txBox="1"/>
-          <p:nvPr/>
-        </p:nvSpPr>
-        <p:spPr>
-          <a:xfrm>
-            <a:off x="783067" y="2312085"/>
-            <a:ext cx="8534400" cy="3416320"/>
-          </a:xfrm>
-          <a:prstGeom prst="rect">
-            <a:avLst/>
-          </a:prstGeom>
-          <a:noFill/>
-        </p:spPr>
-        <p:txBody>
-          <a:bodyPr wrap="square" rtlCol="0">
-            <a:spAutoFit/>
-          </a:bodyPr>
-          <a:lstStyle/>
-          <a:p>
-            <a:pPr marL="285750" indent="-285750">
-              <a:buFont typeface="Arial" panose="020B0604020202020204" pitchFamily="34" charset="0"/>
-              <a:buChar char="•"/>
-            </a:pPr>
-            <a:r>
-              <a:rPr lang="sr-Latn-RS" sz="3600" dirty="0" smtClean="0"/>
-              <a:t>A</a:t>
-            </a:r>
-            <a:r>
-              <a:rPr lang="en-US" sz="3600" dirty="0" smtClean="0"/>
-              <a:t> </a:t>
-            </a:r>
-            <a:r>
-              <a:rPr lang="en-US" sz="3600" i="1" dirty="0"/>
-              <a:t>query</a:t>
-            </a:r>
-            <a:r>
-              <a:rPr lang="en-US" sz="3600" dirty="0"/>
-              <a:t> returns data </a:t>
-            </a:r>
-            <a:r>
-              <a:rPr lang="en-US" sz="3600" b="1" dirty="0"/>
-              <a:t>and does not change any </a:t>
-            </a:r>
-            <a:r>
-              <a:rPr lang="en-US" sz="3600" b="1" dirty="0" smtClean="0"/>
-              <a:t>state</a:t>
-            </a:r>
-            <a:endParaRPr lang="sr-Latn-RS" sz="3600" b="1" dirty="0" smtClean="0"/>
-          </a:p>
-          <a:p>
-            <a:pPr marL="285750" indent="-285750">
-              <a:buFont typeface="Arial" panose="020B0604020202020204" pitchFamily="34" charset="0"/>
-              <a:buChar char="•"/>
-            </a:pPr>
-            <a:r>
-              <a:rPr lang="sr-Latn-RS" sz="3600" dirty="0" smtClean="0"/>
-              <a:t>A query does not change any state =&gt; no business logic</a:t>
-            </a:r>
-          </a:p>
-          <a:p>
-            <a:r>
-              <a:rPr lang="sr-Latn-RS" sz="3600" dirty="0" smtClean="0"/>
-              <a:t>  =&gt; no domain layer</a:t>
-            </a:r>
-          </a:p>
-          <a:p>
-            <a:r>
-              <a:rPr lang="sr-Latn-RS" sz="3600" dirty="0"/>
-              <a:t> </a:t>
-            </a:r>
-            <a:r>
-              <a:rPr lang="sr-Latn-RS" sz="3600" dirty="0" smtClean="0"/>
-              <a:t> =&gt; no domain driven design</a:t>
-            </a:r>
-            <a:endParaRPr lang="sr-Latn-RS" sz="3600" dirty="0"/>
-          </a:p>
-        </p:txBody>
-      </p:sp>
-    </p:spTree>
-    <p:extLst>
-      <p:ext uri="{BB962C8B-B14F-4D97-AF65-F5344CB8AC3E}">
-        <p14:creationId xmlns:p14="http://schemas.microsoft.com/office/powerpoint/2010/main" val="548201510"/>
-      </p:ext>
-    </p:extLst>
-  </p:cSld>
-  <p:clrMapOvr>
-    <a:masterClrMapping/>
-  </p:clrMapOvr>
-  <p:timing>
-    <p:tnLst>
-      <p:par>
-        <p:cTn id="1" dur="indefinite" restart="never" nodeType="tmRoot"/>
-      </p:par>
-    </p:tnLst>
-  </p:timing>
-</p:sld>
-</file>
-
-<file path=ppt/slides/slide21.xml><?xml version="1.0" encoding="utf-8"?>
-<p:sld xmlns:a="http://schemas.openxmlformats.org/drawingml/2006/main" xmlns:r="http://schemas.openxmlformats.org/officeDocument/2006/relationships" xmlns:p="http://schemas.openxmlformats.org/presentationml/2006/main">
-  <p:cSld>
-    <p:spTree>
-      <p:nvGrpSpPr>
-        <p:cNvPr id="1" name=""/>
-        <p:cNvGrpSpPr/>
-        <p:nvPr/>
-      </p:nvGrpSpPr>
-      <p:grpSpPr>
-        <a:xfrm>
-          <a:off x="0" y="0"/>
-          <a:ext cx="0" cy="0"/>
-          <a:chOff x="0" y="0"/>
-          <a:chExt cx="0" cy="0"/>
-        </a:xfrm>
-      </p:grpSpPr>
-      <p:pic>
-        <p:nvPicPr>
-          <p:cNvPr id="4" name="Content Placeholder 3"/>
-          <p:cNvPicPr>
-            <a:picLocks noGrp="1" noChangeAspect="1"/>
-          </p:cNvPicPr>
-          <p:nvPr>
-            <p:ph idx="1"/>
-          </p:nvPr>
-        </p:nvPicPr>
-        <p:blipFill>
-          <a:blip r:embed="rId2">
-            <a:extLst>
-              <a:ext uri="{28A0092B-C50C-407E-A947-70E740481C1C}">
-                <a14:useLocalDpi xmlns:a14="http://schemas.microsoft.com/office/drawing/2010/main" val="0"/>
-              </a:ext>
-            </a:extLst>
-          </a:blip>
-          <a:stretch>
-            <a:fillRect/>
-          </a:stretch>
-        </p:blipFill>
-        <p:spPr>
-          <a:xfrm>
-            <a:off x="2369537" y="685799"/>
-            <a:ext cx="7042240" cy="5756189"/>
-          </a:xfrm>
-        </p:spPr>
-      </p:pic>
-    </p:spTree>
-    <p:extLst>
-      <p:ext uri="{BB962C8B-B14F-4D97-AF65-F5344CB8AC3E}">
-        <p14:creationId xmlns:p14="http://schemas.microsoft.com/office/powerpoint/2010/main" val="4237411437"/>
-      </p:ext>
-    </p:extLst>
-  </p:cSld>
-  <p:clrMapOvr>
-    <a:masterClrMapping/>
-  </p:clrMapOvr>
-  <p:timing>
-    <p:tnLst>
-      <p:par>
-        <p:cTn id="1" dur="indefinite" restart="never" nodeType="tmRoot"/>
-      </p:par>
-    </p:tnLst>
-  </p:timing>
-</p:sld>
-</file>
-
-<file path=ppt/slides/slide22.xml><?xml version="1.0" encoding="utf-8"?>
-<p:sld xmlns:a="http://schemas.openxmlformats.org/drawingml/2006/main" xmlns:r="http://schemas.openxmlformats.org/officeDocument/2006/relationships" xmlns:p="http://schemas.openxmlformats.org/presentationml/2006/main">
-  <p:cSld>
-    <p:spTree>
-      <p:nvGrpSpPr>
-        <p:cNvPr id="1" name=""/>
-        <p:cNvGrpSpPr/>
-        <p:nvPr/>
-      </p:nvGrpSpPr>
-      <p:grpSpPr>
-        <a:xfrm>
-          <a:off x="0" y="0"/>
-          <a:ext cx="0" cy="0"/>
-          <a:chOff x="0" y="0"/>
-          <a:chExt cx="0" cy="0"/>
-        </a:xfrm>
-      </p:grpSpPr>
-      <p:sp>
-        <p:nvSpPr>
-          <p:cNvPr id="2" name="Title 1"/>
-          <p:cNvSpPr>
-            <a:spLocks noGrp="1"/>
-          </p:cNvSpPr>
-          <p:nvPr>
-            <p:ph type="title"/>
-          </p:nvPr>
-        </p:nvSpPr>
-        <p:spPr>
-          <a:xfrm>
-            <a:off x="783067" y="805018"/>
-            <a:ext cx="8534400" cy="1507067"/>
-          </a:xfrm>
-        </p:spPr>
-        <p:txBody>
-          <a:bodyPr/>
-          <a:lstStyle/>
-          <a:p>
-            <a:r>
-              <a:rPr lang="en-US" dirty="0" err="1" smtClean="0"/>
-              <a:t>Entit</a:t>
-            </a:r>
-            <a:r>
-              <a:rPr lang="sr-Latn-RS" dirty="0" smtClean="0"/>
-              <a:t>ies</a:t>
-            </a:r>
-            <a:r>
-              <a:rPr lang="en-US" dirty="0" smtClean="0"/>
-              <a:t> </a:t>
-            </a:r>
-            <a:r>
-              <a:rPr lang="sr-Latn-RS" dirty="0" smtClean="0"/>
-              <a:t>and</a:t>
-            </a:r>
-            <a:r>
-              <a:rPr lang="en-US" dirty="0" smtClean="0"/>
-              <a:t> </a:t>
-            </a:r>
-            <a:r>
-              <a:rPr lang="en-US" dirty="0"/>
-              <a:t>Value </a:t>
-            </a:r>
-            <a:r>
-              <a:rPr lang="en-US" dirty="0" smtClean="0"/>
-              <a:t>Object</a:t>
-            </a:r>
-            <a:r>
-              <a:rPr lang="sr-Latn-RS" dirty="0" smtClean="0"/>
-              <a:t>s</a:t>
-            </a:r>
-            <a:endParaRPr lang="sr-Latn-RS" dirty="0"/>
-          </a:p>
-        </p:txBody>
-      </p:sp>
-      <p:sp>
-        <p:nvSpPr>
-          <p:cNvPr id="5" name="TextBox 4"/>
-          <p:cNvSpPr txBox="1"/>
-          <p:nvPr/>
-        </p:nvSpPr>
-        <p:spPr>
-          <a:xfrm>
-            <a:off x="783067" y="2312085"/>
-            <a:ext cx="10898860" cy="4708981"/>
-          </a:xfrm>
-          <a:prstGeom prst="rect">
-            <a:avLst/>
-          </a:prstGeom>
-          <a:noFill/>
-        </p:spPr>
-        <p:txBody>
-          <a:bodyPr wrap="square" rtlCol="0">
-            <a:spAutoFit/>
-          </a:bodyPr>
-          <a:lstStyle/>
-          <a:p>
-            <a:pPr marL="285750" indent="-285750">
-              <a:buFont typeface="Arial" panose="020B0604020202020204" pitchFamily="34" charset="0"/>
-              <a:buChar char="•"/>
-            </a:pPr>
-            <a:r>
-              <a:rPr lang="en-US" sz="2400" dirty="0" err="1" smtClean="0"/>
-              <a:t>Entit</a:t>
-            </a:r>
-            <a:r>
-              <a:rPr lang="sr-Latn-RS" sz="2400" dirty="0" smtClean="0"/>
-              <a:t>ies</a:t>
-            </a:r>
-            <a:r>
-              <a:rPr lang="en-US" sz="2400" dirty="0" smtClean="0"/>
-              <a:t> </a:t>
-            </a:r>
-            <a:r>
-              <a:rPr lang="sr-Latn-RS" sz="2400" dirty="0" smtClean="0"/>
-              <a:t>have</a:t>
-            </a:r>
-            <a:r>
-              <a:rPr lang="en-US" sz="2400" dirty="0" smtClean="0"/>
-              <a:t> </a:t>
-            </a:r>
-            <a:r>
-              <a:rPr lang="en-US" sz="2400" dirty="0"/>
-              <a:t>id </a:t>
-            </a:r>
-            <a:r>
-              <a:rPr lang="sr-Latn-RS" sz="2400" dirty="0" smtClean="0"/>
-              <a:t>and they are</a:t>
-            </a:r>
-            <a:r>
-              <a:rPr lang="en-US" sz="2400" dirty="0" smtClean="0"/>
-              <a:t> </a:t>
-            </a:r>
-            <a:r>
-              <a:rPr lang="sr-Latn-RS" sz="2400" dirty="0" smtClean="0"/>
-              <a:t>mutable</a:t>
-            </a:r>
-          </a:p>
-          <a:p>
-            <a:pPr marL="285750" indent="-285750">
-              <a:buFont typeface="Arial" panose="020B0604020202020204" pitchFamily="34" charset="0"/>
-              <a:buChar char="•"/>
-            </a:pPr>
-            <a:endParaRPr lang="sr-Latn-RS" sz="3600" dirty="0" smtClean="0"/>
-          </a:p>
-          <a:p>
-            <a:pPr marL="285750" indent="-285750">
-              <a:buFont typeface="Arial" panose="020B0604020202020204" pitchFamily="34" charset="0"/>
-              <a:buChar char="•"/>
-            </a:pPr>
-            <a:r>
-              <a:rPr lang="en-US" sz="2400" dirty="0" smtClean="0"/>
-              <a:t>Value Object</a:t>
-            </a:r>
-            <a:r>
-              <a:rPr lang="sr-Latn-RS" sz="2400" dirty="0" smtClean="0"/>
-              <a:t>s</a:t>
-            </a:r>
-            <a:r>
-              <a:rPr lang="en-US" sz="2400" dirty="0" smtClean="0"/>
-              <a:t> </a:t>
-            </a:r>
-            <a:r>
-              <a:rPr lang="sr-Latn-RS" sz="2400" dirty="0" smtClean="0"/>
-              <a:t>have not</a:t>
-            </a:r>
-            <a:r>
-              <a:rPr lang="en-US" sz="2400" dirty="0" smtClean="0"/>
-              <a:t> </a:t>
-            </a:r>
-            <a:r>
-              <a:rPr lang="en-US" sz="2400" dirty="0"/>
-              <a:t>id </a:t>
-            </a:r>
-            <a:r>
-              <a:rPr lang="sr-Latn-RS" sz="2400" dirty="0" smtClean="0"/>
-              <a:t>and</a:t>
-            </a:r>
-            <a:r>
-              <a:rPr lang="en-US" sz="2400" dirty="0" smtClean="0"/>
-              <a:t> </a:t>
-            </a:r>
-            <a:r>
-              <a:rPr lang="sr-Latn-RS" sz="2400" dirty="0" smtClean="0"/>
-              <a:t>they are</a:t>
-            </a:r>
-            <a:r>
-              <a:rPr lang="en-US" sz="2400" dirty="0" smtClean="0"/>
-              <a:t> immutable</a:t>
-            </a:r>
-            <a:endParaRPr lang="sr-Latn-RS" sz="2400" dirty="0" smtClean="0"/>
-          </a:p>
-          <a:p>
-            <a:pPr marL="285750" indent="-285750">
-              <a:buFont typeface="Arial" panose="020B0604020202020204" pitchFamily="34" charset="0"/>
-              <a:buChar char="•"/>
-            </a:pPr>
-            <a:endParaRPr lang="sr-Latn-RS" sz="2400" dirty="0" smtClean="0"/>
-          </a:p>
-          <a:p>
-            <a:pPr marL="285750" indent="-285750">
-              <a:buFont typeface="Arial" panose="020B0604020202020204" pitchFamily="34" charset="0"/>
-              <a:buChar char="•"/>
-            </a:pPr>
-            <a:r>
-              <a:rPr lang="en-US" sz="2400" dirty="0" err="1"/>
-              <a:t>Entit</a:t>
-            </a:r>
-            <a:r>
-              <a:rPr lang="sr-Latn-RS" sz="2400" dirty="0"/>
-              <a:t>ies</a:t>
-            </a:r>
-            <a:r>
-              <a:rPr lang="en-US" sz="2400" dirty="0"/>
-              <a:t> </a:t>
-            </a:r>
-            <a:r>
-              <a:rPr lang="sr-Latn-RS" sz="2400" dirty="0" smtClean="0"/>
-              <a:t>have their tables in the database</a:t>
-            </a:r>
-          </a:p>
-          <a:p>
-            <a:pPr marL="285750" indent="-285750">
-              <a:buFont typeface="Arial" panose="020B0604020202020204" pitchFamily="34" charset="0"/>
-              <a:buChar char="•"/>
-            </a:pPr>
-            <a:endParaRPr lang="sr-Latn-RS" sz="2400" dirty="0" smtClean="0"/>
-          </a:p>
-          <a:p>
-            <a:pPr marL="285750" indent="-285750">
-              <a:buFont typeface="Arial" panose="020B0604020202020204" pitchFamily="34" charset="0"/>
-              <a:buChar char="•"/>
-            </a:pPr>
-            <a:r>
-              <a:rPr lang="en-US" sz="2400" dirty="0"/>
-              <a:t>Value </a:t>
-            </a:r>
-            <a:r>
-              <a:rPr lang="en-US" sz="2400" dirty="0" smtClean="0"/>
-              <a:t>Object</a:t>
-            </a:r>
-            <a:r>
-              <a:rPr lang="sr-Latn-RS" sz="2400" dirty="0" smtClean="0"/>
-              <a:t>s</a:t>
-            </a:r>
-            <a:r>
-              <a:rPr lang="en-US" sz="2400" dirty="0" smtClean="0"/>
-              <a:t> </a:t>
-            </a:r>
-            <a:r>
-              <a:rPr lang="sr-Latn-RS" sz="2400" dirty="0" smtClean="0"/>
-              <a:t>have not </a:t>
-            </a:r>
-            <a:r>
-              <a:rPr lang="sr-Latn-RS" sz="2400" dirty="0"/>
-              <a:t>their </a:t>
-            </a:r>
-            <a:r>
-              <a:rPr lang="sr-Latn-RS" sz="2400" dirty="0" smtClean="0"/>
-              <a:t>tables </a:t>
-            </a:r>
-            <a:r>
-              <a:rPr lang="sr-Latn-RS" sz="2400" dirty="0"/>
-              <a:t>in the database</a:t>
-            </a:r>
-            <a:endParaRPr lang="sr-Latn-RS" sz="2400" dirty="0" smtClean="0"/>
-          </a:p>
-          <a:p>
-            <a:pPr marL="285750" indent="-285750">
-              <a:buFont typeface="Arial" panose="020B0604020202020204" pitchFamily="34" charset="0"/>
-              <a:buChar char="•"/>
-            </a:pPr>
-            <a:endParaRPr lang="en-US" sz="2400" dirty="0"/>
-          </a:p>
-          <a:p>
-            <a:pPr marL="285750" indent="-285750">
-              <a:buFont typeface="Arial" panose="020B0604020202020204" pitchFamily="34" charset="0"/>
-              <a:buChar char="•"/>
-            </a:pPr>
-            <a:r>
-              <a:rPr lang="en-US" sz="2400" dirty="0"/>
-              <a:t>Value </a:t>
-            </a:r>
-            <a:r>
-              <a:rPr lang="en-US" sz="2400" dirty="0" smtClean="0"/>
-              <a:t>Object</a:t>
-            </a:r>
-            <a:r>
-              <a:rPr lang="sr-Latn-RS" sz="2400" dirty="0" smtClean="0"/>
-              <a:t>s</a:t>
-            </a:r>
-            <a:r>
-              <a:rPr lang="en-US" sz="2400" dirty="0" smtClean="0"/>
-              <a:t> </a:t>
-            </a:r>
-            <a:r>
-              <a:rPr lang="sr-Latn-RS" sz="2400" dirty="0" smtClean="0"/>
-              <a:t>cannot exist without and entity</a:t>
-            </a:r>
-            <a:endParaRPr lang="en-US" sz="2400" dirty="0"/>
-          </a:p>
-          <a:p>
-            <a:pPr marL="285750" indent="-285750">
-              <a:buFont typeface="Arial" panose="020B0604020202020204" pitchFamily="34" charset="0"/>
-              <a:buChar char="•"/>
-            </a:pPr>
-            <a:endParaRPr lang="en-US" sz="2400" dirty="0"/>
-          </a:p>
-          <a:p>
-            <a:pPr marL="285750" indent="-285750">
-              <a:buFont typeface="Arial" panose="020B0604020202020204" pitchFamily="34" charset="0"/>
-              <a:buChar char="•"/>
-            </a:pPr>
-            <a:endParaRPr lang="en-US" sz="2400" dirty="0"/>
-          </a:p>
-          <a:p>
-            <a:pPr marL="285750" indent="-285750">
-              <a:buFont typeface="Arial" panose="020B0604020202020204" pitchFamily="34" charset="0"/>
-              <a:buChar char="•"/>
-            </a:pPr>
-            <a:endParaRPr lang="sr-Latn-RS" sz="2400" dirty="0"/>
-          </a:p>
-        </p:txBody>
-      </p:sp>
-    </p:spTree>
-    <p:extLst>
-      <p:ext uri="{BB962C8B-B14F-4D97-AF65-F5344CB8AC3E}">
-        <p14:creationId xmlns:p14="http://schemas.microsoft.com/office/powerpoint/2010/main" val="1019193396"/>
-      </p:ext>
-    </p:extLst>
-  </p:cSld>
-  <p:clrMapOvr>
-    <a:masterClrMapping/>
-  </p:clrMapOvr>
-  <p:timing>
-    <p:tnLst>
-      <p:par>
-        <p:cTn id="1" dur="indefinite" restart="never" nodeType="tmRoot"/>
-      </p:par>
-    </p:tnLst>
-  </p:timing>
-</p:sld>
-</file>
-
-<file path=ppt/slides/slide23.xml><?xml version="1.0" encoding="utf-8"?>
-<p:sld xmlns:a="http://schemas.openxmlformats.org/drawingml/2006/main" xmlns:r="http://schemas.openxmlformats.org/officeDocument/2006/relationships" xmlns:p="http://schemas.openxmlformats.org/presentationml/2006/main">
-  <p:cSld>
-    <p:spTree>
-      <p:nvGrpSpPr>
-        <p:cNvPr id="1" name=""/>
-        <p:cNvGrpSpPr/>
-        <p:nvPr/>
-      </p:nvGrpSpPr>
-      <p:grpSpPr>
-        <a:xfrm>
-          <a:off x="0" y="0"/>
-          <a:ext cx="0" cy="0"/>
-          <a:chOff x="0" y="0"/>
-          <a:chExt cx="0" cy="0"/>
-        </a:xfrm>
-      </p:grpSpPr>
-      <p:sp>
-        <p:nvSpPr>
-          <p:cNvPr id="5" name="TextBox 4"/>
-          <p:cNvSpPr txBox="1"/>
-          <p:nvPr/>
-        </p:nvSpPr>
-        <p:spPr>
-          <a:xfrm>
-            <a:off x="799542" y="1488301"/>
-            <a:ext cx="10898860" cy="3416320"/>
-          </a:xfrm>
-          <a:prstGeom prst="rect">
-            <a:avLst/>
-          </a:prstGeom>
-          <a:noFill/>
-        </p:spPr>
-        <p:txBody>
-          <a:bodyPr wrap="square" rtlCol="0">
-            <a:spAutoFit/>
-          </a:bodyPr>
-          <a:lstStyle/>
-          <a:p>
-            <a:pPr marL="285750" indent="-285750">
-              <a:buFont typeface="Arial" panose="020B0604020202020204" pitchFamily="34" charset="0"/>
-              <a:buChar char="•"/>
-            </a:pPr>
-            <a:r>
-              <a:rPr lang="sr-Latn-RS" sz="7200" b="1" dirty="0" smtClean="0"/>
-              <a:t>Be careful </a:t>
-            </a:r>
-            <a:r>
-              <a:rPr lang="sr-Latn-RS" sz="7200" dirty="0" smtClean="0"/>
-              <a:t>of too many value object types</a:t>
-            </a:r>
-            <a:endParaRPr lang="en-US" sz="7200" dirty="0"/>
-          </a:p>
-          <a:p>
-            <a:pPr marL="285750" indent="-285750">
-              <a:buFont typeface="Arial" panose="020B0604020202020204" pitchFamily="34" charset="0"/>
-              <a:buChar char="•"/>
-            </a:pPr>
-            <a:endParaRPr lang="sr-Latn-RS" sz="7200" dirty="0"/>
-          </a:p>
-        </p:txBody>
-      </p:sp>
-    </p:spTree>
-    <p:extLst>
-      <p:ext uri="{BB962C8B-B14F-4D97-AF65-F5344CB8AC3E}">
-        <p14:creationId xmlns:p14="http://schemas.microsoft.com/office/powerpoint/2010/main" val="1277892097"/>
-      </p:ext>
-    </p:extLst>
-  </p:cSld>
-  <p:clrMapOvr>
-    <a:masterClrMapping/>
-  </p:clrMapOvr>
-  <p:timing>
-    <p:tnLst>
-      <p:par>
-        <p:cTn id="1" dur="indefinite" restart="never" nodeType="tmRoot"/>
-      </p:par>
-    </p:tnLst>
-  </p:timing>
-</p:sld>
-</file>
-
-<file path=ppt/slides/slide24.xml><?xml version="1.0" encoding="utf-8"?>
-<p:sld xmlns:a="http://schemas.openxmlformats.org/drawingml/2006/main" xmlns:r="http://schemas.openxmlformats.org/officeDocument/2006/relationships" xmlns:p="http://schemas.openxmlformats.org/presentationml/2006/main">
-  <p:cSld>
-    <p:spTree>
-      <p:nvGrpSpPr>
-        <p:cNvPr id="1" name=""/>
-        <p:cNvGrpSpPr/>
-        <p:nvPr/>
-      </p:nvGrpSpPr>
-      <p:grpSpPr>
-        <a:xfrm>
-          <a:off x="0" y="0"/>
-          <a:ext cx="0" cy="0"/>
-          <a:chOff x="0" y="0"/>
-          <a:chExt cx="0" cy="0"/>
-        </a:xfrm>
-      </p:grpSpPr>
-      <p:sp>
-        <p:nvSpPr>
-          <p:cNvPr id="5" name="TextBox 4"/>
-          <p:cNvSpPr txBox="1"/>
-          <p:nvPr/>
-        </p:nvSpPr>
-        <p:spPr>
-          <a:xfrm>
-            <a:off x="799542" y="1488301"/>
-            <a:ext cx="10898860" cy="4524315"/>
-          </a:xfrm>
-          <a:prstGeom prst="rect">
-            <a:avLst/>
-          </a:prstGeom>
-          <a:noFill/>
-        </p:spPr>
-        <p:txBody>
-          <a:bodyPr wrap="square" rtlCol="0">
-            <a:spAutoFit/>
-          </a:bodyPr>
-          <a:lstStyle/>
-          <a:p>
-            <a:pPr marL="285750" indent="-285750">
-              <a:buFont typeface="Arial" panose="020B0604020202020204" pitchFamily="34" charset="0"/>
-              <a:buChar char="•"/>
-            </a:pPr>
-            <a:r>
-              <a:rPr lang="sr-Latn-RS" sz="7200" dirty="0" smtClean="0"/>
-              <a:t>Add value </a:t>
-            </a:r>
-            <a:r>
-              <a:rPr lang="sr-Latn-RS" sz="7200" dirty="0" smtClean="0"/>
-              <a:t>object </a:t>
-            </a:r>
-            <a:r>
-              <a:rPr lang="sr-Latn-RS" sz="7200" dirty="0" smtClean="0"/>
-              <a:t>types </a:t>
-            </a:r>
-            <a:r>
-              <a:rPr lang="sr-Latn-RS" sz="7200" b="1" dirty="0" smtClean="0"/>
-              <a:t>as you need them(not before)</a:t>
-            </a:r>
-            <a:endParaRPr lang="en-US" sz="7200" b="1" dirty="0"/>
-          </a:p>
-          <a:p>
-            <a:pPr marL="285750" indent="-285750">
-              <a:buFont typeface="Arial" panose="020B0604020202020204" pitchFamily="34" charset="0"/>
-              <a:buChar char="•"/>
-            </a:pPr>
-            <a:endParaRPr lang="sr-Latn-RS" sz="7200" dirty="0"/>
-          </a:p>
-        </p:txBody>
-      </p:sp>
-    </p:spTree>
-    <p:extLst>
-      <p:ext uri="{BB962C8B-B14F-4D97-AF65-F5344CB8AC3E}">
-        <p14:creationId xmlns:p14="http://schemas.microsoft.com/office/powerpoint/2010/main" val="1125663737"/>
-      </p:ext>
-    </p:extLst>
-  </p:cSld>
-  <p:clrMapOvr>
-    <a:masterClrMapping/>
-  </p:clrMapOvr>
-  <p:timing>
-    <p:tnLst>
-      <p:par>
-        <p:cTn id="1" dur="indefinite" restart="never" nodeType="tmRoot"/>
-      </p:par>
-    </p:tnLst>
-  </p:timing>
-</p:sld>
-</file>
-
-<file path=ppt/slides/slide25.xml><?xml version="1.0" encoding="utf-8"?>
-<p:sld xmlns:a="http://schemas.openxmlformats.org/drawingml/2006/main" xmlns:r="http://schemas.openxmlformats.org/officeDocument/2006/relationships" xmlns:p="http://schemas.openxmlformats.org/presentationml/2006/main">
-  <p:cSld>
-    <p:spTree>
-      <p:nvGrpSpPr>
-        <p:cNvPr id="1" name=""/>
-        <p:cNvGrpSpPr/>
-        <p:nvPr/>
-      </p:nvGrpSpPr>
-      <p:grpSpPr>
-        <a:xfrm>
-          <a:off x="0" y="0"/>
-          <a:ext cx="0" cy="0"/>
-          <a:chOff x="0" y="0"/>
-          <a:chExt cx="0" cy="0"/>
-        </a:xfrm>
-      </p:grpSpPr>
       <p:pic>
         <p:nvPicPr>
           <p:cNvPr id="3" name="Content Placeholder 2"/>
@@ -7488,7 +7162,7 @@
 </p:sld>
 </file>
 
-<file path=ppt/slides/slide26.xml><?xml version="1.0" encoding="utf-8"?>
+<file path=ppt/slides/slide21.xml><?xml version="1.0" encoding="utf-8"?>
 <p:sld xmlns:a="http://schemas.openxmlformats.org/drawingml/2006/main" xmlns:r="http://schemas.openxmlformats.org/officeDocument/2006/relationships" xmlns:p="http://schemas.openxmlformats.org/presentationml/2006/main">
   <p:cSld>
     <p:spTree>

</xml_diff>